<commit_message>
Fixed the ttp industry sector idiom, had an extra layer of nesting
</commit_message>
<xml_diff>
--- a/idioms/ttp/industry-sector/diagram.pptx
+++ b/idioms/ttp/industry-sector/diagram.pptx
@@ -288,7 +288,7 @@
           <a:p>
             <a:fld id="{13F24B86-36D2-4655-BE2F-98B661AC85E1}" type="datetimeFigureOut">
               <a:rPr lang="en-US" smtClean="0"/>
-              <a:t>3/10/2014</a:t>
+              <a:t>3/28/2014</a:t>
             </a:fld>
             <a:endParaRPr lang="en-US"/>
           </a:p>
@@ -458,7 +458,7 @@
           <a:p>
             <a:fld id="{13F24B86-36D2-4655-BE2F-98B661AC85E1}" type="datetimeFigureOut">
               <a:rPr lang="en-US" smtClean="0"/>
-              <a:t>3/10/2014</a:t>
+              <a:t>3/28/2014</a:t>
             </a:fld>
             <a:endParaRPr lang="en-US"/>
           </a:p>
@@ -638,7 +638,7 @@
           <a:p>
             <a:fld id="{13F24B86-36D2-4655-BE2F-98B661AC85E1}" type="datetimeFigureOut">
               <a:rPr lang="en-US" smtClean="0"/>
-              <a:t>3/10/2014</a:t>
+              <a:t>3/28/2014</a:t>
             </a:fld>
             <a:endParaRPr lang="en-US"/>
           </a:p>
@@ -808,7 +808,7 @@
           <a:p>
             <a:fld id="{13F24B86-36D2-4655-BE2F-98B661AC85E1}" type="datetimeFigureOut">
               <a:rPr lang="en-US" smtClean="0"/>
-              <a:t>3/10/2014</a:t>
+              <a:t>3/28/2014</a:t>
             </a:fld>
             <a:endParaRPr lang="en-US"/>
           </a:p>
@@ -1054,7 +1054,7 @@
           <a:p>
             <a:fld id="{13F24B86-36D2-4655-BE2F-98B661AC85E1}" type="datetimeFigureOut">
               <a:rPr lang="en-US" smtClean="0"/>
-              <a:t>3/10/2014</a:t>
+              <a:t>3/28/2014</a:t>
             </a:fld>
             <a:endParaRPr lang="en-US"/>
           </a:p>
@@ -1342,7 +1342,7 @@
           <a:p>
             <a:fld id="{13F24B86-36D2-4655-BE2F-98B661AC85E1}" type="datetimeFigureOut">
               <a:rPr lang="en-US" smtClean="0"/>
-              <a:t>3/10/2014</a:t>
+              <a:t>3/28/2014</a:t>
             </a:fld>
             <a:endParaRPr lang="en-US"/>
           </a:p>
@@ -1764,7 +1764,7 @@
           <a:p>
             <a:fld id="{13F24B86-36D2-4655-BE2F-98B661AC85E1}" type="datetimeFigureOut">
               <a:rPr lang="en-US" smtClean="0"/>
-              <a:t>3/10/2014</a:t>
+              <a:t>3/28/2014</a:t>
             </a:fld>
             <a:endParaRPr lang="en-US"/>
           </a:p>
@@ -1882,7 +1882,7 @@
           <a:p>
             <a:fld id="{13F24B86-36D2-4655-BE2F-98B661AC85E1}" type="datetimeFigureOut">
               <a:rPr lang="en-US" smtClean="0"/>
-              <a:t>3/10/2014</a:t>
+              <a:t>3/28/2014</a:t>
             </a:fld>
             <a:endParaRPr lang="en-US"/>
           </a:p>
@@ -1977,7 +1977,7 @@
           <a:p>
             <a:fld id="{13F24B86-36D2-4655-BE2F-98B661AC85E1}" type="datetimeFigureOut">
               <a:rPr lang="en-US" smtClean="0"/>
-              <a:t>3/10/2014</a:t>
+              <a:t>3/28/2014</a:t>
             </a:fld>
             <a:endParaRPr lang="en-US"/>
           </a:p>
@@ -2254,7 +2254,7 @@
           <a:p>
             <a:fld id="{13F24B86-36D2-4655-BE2F-98B661AC85E1}" type="datetimeFigureOut">
               <a:rPr lang="en-US" smtClean="0"/>
-              <a:t>3/10/2014</a:t>
+              <a:t>3/28/2014</a:t>
             </a:fld>
             <a:endParaRPr lang="en-US"/>
           </a:p>
@@ -2507,7 +2507,7 @@
           <a:p>
             <a:fld id="{13F24B86-36D2-4655-BE2F-98B661AC85E1}" type="datetimeFigureOut">
               <a:rPr lang="en-US" smtClean="0"/>
-              <a:t>3/10/2014</a:t>
+              <a:t>3/28/2014</a:t>
             </a:fld>
             <a:endParaRPr lang="en-US"/>
           </a:p>
@@ -2720,7 +2720,7 @@
           <a:p>
             <a:fld id="{13F24B86-36D2-4655-BE2F-98B661AC85E1}" type="datetimeFigureOut">
               <a:rPr lang="en-US" smtClean="0"/>
-              <a:t>3/10/2014</a:t>
+              <a:t>3/28/2014</a:t>
             </a:fld>
             <a:endParaRPr lang="en-US"/>
           </a:p>
@@ -3104,14 +3104,14 @@
           <p:nvPr>
             <p:extLst>
               <p:ext uri="{D42A27DB-BD31-4B8C-83A1-F6EECF244321}">
-                <p14:modId xmlns:p14="http://schemas.microsoft.com/office/powerpoint/2010/main" val="2830110254"/>
+                <p14:modId xmlns:p14="http://schemas.microsoft.com/office/powerpoint/2010/main" val="2562202638"/>
               </p:ext>
             </p:extLst>
           </p:nvPr>
         </p:nvGraphicFramePr>
         <p:xfrm>
           <a:off x="1219200" y="1447800"/>
-          <a:ext cx="4373880" cy="2175475"/>
+          <a:ext cx="4373880" cy="1898876"/>
         </p:xfrm>
         <a:graphic>
           <a:graphicData uri="http://schemas.openxmlformats.org/drawingml/2006/table">
@@ -3350,118 +3350,6 @@
                     <a:lstStyle/>
                     <a:p>
                       <a:r>
-                        <a:rPr lang="en-US" sz="1200" b="0" dirty="0" smtClean="0"/>
-                        <a:t>Behavior</a:t>
-                      </a:r>
-                      <a:endParaRPr lang="en-US" sz="1200" b="0" dirty="0"/>
-                    </a:p>
-                  </a:txBody>
-                  <a:tcPr>
-                    <a:lnL w="12700" cap="flat" cmpd="sng" algn="ctr">
-                      <a:solidFill>
-                        <a:schemeClr val="tx1"/>
-                      </a:solidFill>
-                      <a:prstDash val="solid"/>
-                      <a:round/>
-                      <a:headEnd type="none" w="med" len="med"/>
-                      <a:tailEnd type="none" w="med" len="med"/>
-                    </a:lnL>
-                    <a:lnR w="12700" cap="flat" cmpd="sng" algn="ctr">
-                      <a:solidFill>
-                        <a:schemeClr val="tx1"/>
-                      </a:solidFill>
-                      <a:prstDash val="solid"/>
-                      <a:round/>
-                      <a:headEnd type="none" w="med" len="med"/>
-                      <a:tailEnd type="none" w="med" len="med"/>
-                    </a:lnR>
-                    <a:lnT w="12700" cap="flat" cmpd="sng" algn="ctr">
-                      <a:noFill/>
-                      <a:prstDash val="solid"/>
-                      <a:round/>
-                      <a:headEnd type="none" w="med" len="med"/>
-                      <a:tailEnd type="none" w="med" len="med"/>
-                    </a:lnT>
-                    <a:lnB w="12700" cap="flat" cmpd="sng" algn="ctr">
-                      <a:noFill/>
-                      <a:prstDash val="solid"/>
-                      <a:round/>
-                      <a:headEnd type="none" w="med" len="med"/>
-                      <a:tailEnd type="none" w="med" len="med"/>
-                    </a:lnB>
-                    <a:lnTlToBr w="12700" cmpd="sng">
-                      <a:noFill/>
-                      <a:prstDash val="solid"/>
-                    </a:lnTlToBr>
-                    <a:lnBlToTr w="12700" cmpd="sng">
-                      <a:noFill/>
-                      <a:prstDash val="solid"/>
-                    </a:lnBlToTr>
-                  </a:tcPr>
-                </a:tc>
-                <a:tc>
-                  <a:txBody>
-                    <a:bodyPr/>
-                    <a:lstStyle/>
-                    <a:p>
-                      <a:endParaRPr lang="en-US" sz="1200" dirty="0"/>
-                    </a:p>
-                  </a:txBody>
-                  <a:tcPr>
-                    <a:lnL w="12700" cap="flat" cmpd="sng" algn="ctr">
-                      <a:solidFill>
-                        <a:schemeClr val="tx1"/>
-                      </a:solidFill>
-                      <a:prstDash val="solid"/>
-                      <a:round/>
-                      <a:headEnd type="none" w="med" len="med"/>
-                      <a:tailEnd type="none" w="med" len="med"/>
-                    </a:lnL>
-                    <a:lnR w="12700" cap="flat" cmpd="sng" algn="ctr">
-                      <a:solidFill>
-                        <a:schemeClr val="tx1"/>
-                      </a:solidFill>
-                      <a:prstDash val="solid"/>
-                      <a:round/>
-                      <a:headEnd type="none" w="med" len="med"/>
-                      <a:tailEnd type="none" w="med" len="med"/>
-                    </a:lnR>
-                    <a:lnT w="12700" cap="flat" cmpd="sng" algn="ctr">
-                      <a:noFill/>
-                      <a:prstDash val="solid"/>
-                      <a:round/>
-                      <a:headEnd type="none" w="med" len="med"/>
-                      <a:tailEnd type="none" w="med" len="med"/>
-                    </a:lnT>
-                    <a:lnB w="12700" cap="flat" cmpd="sng" algn="ctr">
-                      <a:noFill/>
-                      <a:prstDash val="solid"/>
-                      <a:round/>
-                      <a:headEnd type="none" w="med" len="med"/>
-                      <a:tailEnd type="none" w="med" len="med"/>
-                    </a:lnB>
-                    <a:lnTlToBr w="12700" cmpd="sng">
-                      <a:noFill/>
-                      <a:prstDash val="solid"/>
-                    </a:lnTlToBr>
-                    <a:lnBlToTr w="12700" cmpd="sng">
-                      <a:noFill/>
-                      <a:prstDash val="solid"/>
-                    </a:lnBlToTr>
-                  </a:tcPr>
-                </a:tc>
-              </a:tr>
-              <a:tr h="276599">
-                <a:tc>
-                  <a:txBody>
-                    <a:bodyPr/>
-                    <a:lstStyle/>
-                    <a:p>
-                      <a:r>
-                        <a:rPr lang="en-US" sz="1200" b="0" baseline="0" dirty="0" smtClean="0"/>
-                        <a:t>    </a:t>
-                      </a:r>
-                      <a:r>
                         <a:rPr lang="en-US" sz="1200" b="0" baseline="0" dirty="0" err="1" smtClean="0"/>
                         <a:t>Victim_Targeting</a:t>
                       </a:r>
@@ -3570,12 +3458,12 @@
                     <a:lstStyle/>
                     <a:p>
                       <a:r>
-                        <a:rPr lang="en-US" sz="1200" b="0" dirty="0" smtClean="0"/>
+                        <a:rPr lang="en-US" sz="1200" b="0" baseline="0" dirty="0" smtClean="0"/>
                         <a:t>    </a:t>
                       </a:r>
                       <a:r>
                         <a:rPr lang="en-US" sz="1200" b="0" baseline="0" dirty="0" smtClean="0"/>
-                        <a:t>    Identity</a:t>
+                        <a:t>Identity</a:t>
                       </a:r>
                       <a:endParaRPr lang="en-US" sz="1200" b="0" dirty="0" smtClean="0"/>
                     </a:p>
@@ -3695,7 +3583,11 @@
                     <a:p>
                       <a:r>
                         <a:rPr lang="en-US" sz="1200" b="0" dirty="0" smtClean="0"/>
-                        <a:t>            Specification</a:t>
+                        <a:t>        </a:t>
+                      </a:r>
+                      <a:r>
+                        <a:rPr lang="en-US" sz="1200" b="0" dirty="0" smtClean="0"/>
+                        <a:t>Specification</a:t>
                       </a:r>
                       <a:endParaRPr lang="en-US" sz="1200" b="0" dirty="0"/>
                     </a:p>
@@ -3803,7 +3695,7 @@
                     <a:p>
                       <a:r>
                         <a:rPr lang="en-US" sz="1200" b="0" dirty="0" smtClean="0"/>
-                        <a:t>                </a:t>
+                        <a:t>            </a:t>
                       </a:r>
                       <a:r>
                         <a:rPr lang="en-US" sz="1200" b="0" dirty="0" err="1" smtClean="0"/>

</xml_diff>

<commit_message>
fixed industry sector diagram
</commit_message>
<xml_diff>
--- a/idioms/ttp/industry-sector/diagram.pptx
+++ b/idioms/ttp/industry-sector/diagram.pptx
@@ -3097,41 +3097,42 @@
       </p:grpSpPr>
       <p:graphicFrame>
         <p:nvGraphicFramePr>
-          <p:cNvPr id="6" name="Table 5"/>
+          <p:cNvPr id="3" name="Table 2"/>
           <p:cNvGraphicFramePr>
             <a:graphicFrameLocks noGrp="1"/>
           </p:cNvGraphicFramePr>
           <p:nvPr>
             <p:extLst>
               <p:ext uri="{D42A27DB-BD31-4B8C-83A1-F6EECF244321}">
-                <p14:modId xmlns:p14="http://schemas.microsoft.com/office/powerpoint/2010/main" val="2562202638"/>
+                <p14:modId xmlns:p14="http://schemas.microsoft.com/office/powerpoint/2010/main" val="2899987242"/>
               </p:ext>
             </p:extLst>
           </p:nvPr>
         </p:nvGraphicFramePr>
         <p:xfrm>
-          <a:off x="1219200" y="1447800"/>
-          <a:ext cx="4373880" cy="1898876"/>
+          <a:off x="2733675" y="2564130"/>
+          <a:ext cx="5056497" cy="1889760"/>
         </p:xfrm>
         <a:graphic>
           <a:graphicData uri="http://schemas.openxmlformats.org/drawingml/2006/table">
             <a:tbl>
-              <a:tblPr bandRow="1">
-                <a:tableStyleId>{3C2FFA5D-87B4-456A-9821-1D502468CF0F}</a:tableStyleId>
+              <a:tblPr firstRow="1" bandRow="1">
+                <a:tableStyleId>{69CF1AB2-1976-4502-BF36-3FF5EA218861}</a:tableStyleId>
               </a:tblPr>
               <a:tblGrid>
-                <a:gridCol w="1844040"/>
-                <a:gridCol w="2529840"/>
+                <a:gridCol w="1669485"/>
+                <a:gridCol w="1144200"/>
+                <a:gridCol w="2242812"/>
               </a:tblGrid>
-              <a:tr h="276599">
-                <a:tc gridSpan="2">
+              <a:tr h="306648">
+                <a:tc gridSpan="3">
                   <a:txBody>
                     <a:bodyPr/>
                     <a:lstStyle/>
                     <a:p>
                       <a:pPr algn="ctr"/>
                       <a:r>
-                        <a:rPr lang="en-US" sz="1600" b="1" dirty="0" smtClean="0">
+                        <a:rPr lang="en-US" sz="1600" dirty="0" smtClean="0">
                           <a:solidFill>
                             <a:schemeClr val="bg1"/>
                           </a:solidFill>
@@ -3173,12 +3174,8 @@
                       <a:headEnd type="none" w="med" len="med"/>
                       <a:tailEnd type="none" w="med" len="med"/>
                     </a:lnT>
-                    <a:lnB w="12700" cap="flat" cmpd="sng" algn="ctr">
-                      <a:noFill/>
-                      <a:prstDash val="solid"/>
-                      <a:round/>
-                      <a:headEnd type="none" w="med" len="med"/>
-                      <a:tailEnd type="none" w="med" len="med"/>
+                    <a:lnB w="12700" cmpd="sng">
+                      <a:noFill/>
                     </a:lnB>
                     <a:lnTlToBr w="12700" cmpd="sng">
                       <a:noFill/>
@@ -3189,7 +3186,9 @@
                       <a:prstDash val="solid"/>
                     </a:lnBlToTr>
                     <a:solidFill>
-                      <a:schemeClr val="tx2"/>
+                      <a:schemeClr val="accent1">
+                        <a:lumMod val="75000"/>
+                      </a:schemeClr>
                     </a:solidFill>
                   </a:tcPr>
                 </a:tc>
@@ -3234,18 +3233,36 @@
                     </a:lnBlToTr>
                   </a:tcPr>
                 </a:tc>
+                <a:tc hMerge="1">
+                  <a:txBody>
+                    <a:bodyPr/>
+                    <a:lstStyle/>
+                    <a:p>
+                      <a:endParaRPr lang="en-US"/>
+                    </a:p>
+                  </a:txBody>
+                  <a:tcPr/>
+                </a:tc>
               </a:tr>
-              <a:tr h="276599">
+              <a:tr h="144405">
                 <a:tc>
                   <a:txBody>
                     <a:bodyPr/>
                     <a:lstStyle/>
                     <a:p>
                       <a:r>
-                        <a:rPr lang="en-US" sz="1200" b="0" dirty="0" smtClean="0"/>
-                        <a:t>id</a:t>
+                        <a:rPr lang="en-US" sz="1100" i="0" dirty="0" smtClean="0">
+                          <a:solidFill>
+                            <a:schemeClr val="tx1"/>
+                          </a:solidFill>
+                        </a:rPr>
+                        <a:t>ID</a:t>
                       </a:r>
-                      <a:endParaRPr lang="en-US" sz="1200" b="0" dirty="0"/>
+                      <a:endParaRPr lang="en-US" sz="1100" b="0" i="0" dirty="0">
+                        <a:solidFill>
+                          <a:schemeClr val="tx1"/>
+                        </a:solidFill>
+                      </a:endParaRPr>
                     </a:p>
                   </a:txBody>
                   <a:tcPr>
@@ -3267,19 +3284,242 @@
                       <a:headEnd type="none" w="med" len="med"/>
                       <a:tailEnd type="none" w="med" len="med"/>
                     </a:lnR>
-                    <a:lnT w="12700" cap="flat" cmpd="sng" algn="ctr">
-                      <a:noFill/>
+                    <a:lnT w="12700" cmpd="sng">
+                      <a:noFill/>
+                    </a:lnT>
+                    <a:lnB w="12700" cmpd="sng">
+                      <a:noFill/>
+                    </a:lnB>
+                    <a:lnTlToBr w="12700" cmpd="sng">
+                      <a:noFill/>
+                      <a:prstDash val="solid"/>
+                    </a:lnTlToBr>
+                    <a:lnBlToTr w="12700" cmpd="sng">
+                      <a:noFill/>
+                      <a:prstDash val="solid"/>
+                    </a:lnBlToTr>
+                  </a:tcPr>
+                </a:tc>
+                <a:tc gridSpan="2">
+                  <a:txBody>
+                    <a:bodyPr/>
+                    <a:lstStyle/>
+                    <a:p>
+                      <a:r>
+                        <a:rPr lang="en-US" sz="1100" b="0" dirty="0" smtClean="0">
+                          <a:solidFill>
+                            <a:schemeClr val="tx1"/>
+                          </a:solidFill>
+                        </a:rPr>
+                        <a:t>example:ttp-7d9fe1f7-429d-077e-db51-92c70b8da45a</a:t>
+                      </a:r>
+                    </a:p>
+                  </a:txBody>
+                  <a:tcPr>
+                    <a:lnL w="12700" cap="flat" cmpd="sng" algn="ctr">
+                      <a:solidFill>
+                        <a:schemeClr val="tx1"/>
+                      </a:solidFill>
                       <a:prstDash val="solid"/>
                       <a:round/>
                       <a:headEnd type="none" w="med" len="med"/>
                       <a:tailEnd type="none" w="med" len="med"/>
-                    </a:lnT>
-                    <a:lnB w="12700" cap="flat" cmpd="sng" algn="ctr">
-                      <a:noFill/>
+                    </a:lnL>
+                    <a:lnR w="12700" cap="flat" cmpd="sng" algn="ctr">
+                      <a:solidFill>
+                        <a:schemeClr val="tx1"/>
+                      </a:solidFill>
                       <a:prstDash val="solid"/>
                       <a:round/>
                       <a:headEnd type="none" w="med" len="med"/>
                       <a:tailEnd type="none" w="med" len="med"/>
+                    </a:lnR>
+                    <a:lnT w="12700" cmpd="sng">
+                      <a:noFill/>
+                    </a:lnT>
+                    <a:lnB w="12700" cmpd="sng">
+                      <a:noFill/>
+                    </a:lnB>
+                    <a:lnTlToBr w="12700" cmpd="sng">
+                      <a:noFill/>
+                      <a:prstDash val="solid"/>
+                    </a:lnTlToBr>
+                    <a:lnBlToTr w="12700" cmpd="sng">
+                      <a:noFill/>
+                      <a:prstDash val="solid"/>
+                    </a:lnBlToTr>
+                  </a:tcPr>
+                </a:tc>
+                <a:tc hMerge="1">
+                  <a:txBody>
+                    <a:bodyPr/>
+                    <a:lstStyle/>
+                    <a:p>
+                      <a:endParaRPr lang="en-US"/>
+                    </a:p>
+                  </a:txBody>
+                  <a:tcPr/>
+                </a:tc>
+              </a:tr>
+              <a:tr h="144405">
+                <a:tc>
+                  <a:txBody>
+                    <a:bodyPr/>
+                    <a:lstStyle/>
+                    <a:p>
+                      <a:r>
+                        <a:rPr lang="en-US" sz="1100" i="0" dirty="0" smtClean="0">
+                          <a:solidFill>
+                            <a:schemeClr val="tx1"/>
+                          </a:solidFill>
+                        </a:rPr>
+                        <a:t>Victim Targeting</a:t>
+                      </a:r>
+                      <a:endParaRPr lang="en-US" sz="1100" b="0" i="0" dirty="0">
+                        <a:solidFill>
+                          <a:schemeClr val="tx1"/>
+                        </a:solidFill>
+                      </a:endParaRPr>
+                    </a:p>
+                  </a:txBody>
+                  <a:tcPr>
+                    <a:lnL w="12700" cap="flat" cmpd="sng" algn="ctr">
+                      <a:solidFill>
+                        <a:schemeClr val="tx1"/>
+                      </a:solidFill>
+                      <a:prstDash val="solid"/>
+                      <a:round/>
+                      <a:headEnd type="none" w="med" len="med"/>
+                      <a:tailEnd type="none" w="med" len="med"/>
+                    </a:lnL>
+                    <a:lnR w="12700" cap="flat" cmpd="sng" algn="ctr">
+                      <a:solidFill>
+                        <a:schemeClr val="tx1"/>
+                      </a:solidFill>
+                      <a:prstDash val="solid"/>
+                      <a:round/>
+                      <a:headEnd type="none" w="med" len="med"/>
+                      <a:tailEnd type="none" w="med" len="med"/>
+                    </a:lnR>
+                    <a:lnT w="12700" cmpd="sng">
+                      <a:noFill/>
+                    </a:lnT>
+                    <a:lnB w="12700" cmpd="sng">
+                      <a:noFill/>
+                    </a:lnB>
+                    <a:lnTlToBr w="12700" cmpd="sng">
+                      <a:noFill/>
+                      <a:prstDash val="solid"/>
+                    </a:lnTlToBr>
+                    <a:lnBlToTr w="12700" cmpd="sng">
+                      <a:noFill/>
+                      <a:prstDash val="solid"/>
+                    </a:lnBlToTr>
+                  </a:tcPr>
+                </a:tc>
+                <a:tc gridSpan="2">
+                  <a:txBody>
+                    <a:bodyPr/>
+                    <a:lstStyle/>
+                    <a:p>
+                      <a:endParaRPr lang="en-US" sz="1100" b="0" dirty="0" smtClean="0">
+                        <a:solidFill>
+                          <a:schemeClr val="tx1"/>
+                        </a:solidFill>
+                      </a:endParaRPr>
+                    </a:p>
+                  </a:txBody>
+                  <a:tcPr>
+                    <a:lnL w="12700" cap="flat" cmpd="sng" algn="ctr">
+                      <a:solidFill>
+                        <a:schemeClr val="tx1"/>
+                      </a:solidFill>
+                      <a:prstDash val="solid"/>
+                      <a:round/>
+                      <a:headEnd type="none" w="med" len="med"/>
+                      <a:tailEnd type="none" w="med" len="med"/>
+                    </a:lnL>
+                    <a:lnR w="12700" cap="flat" cmpd="sng" algn="ctr">
+                      <a:solidFill>
+                        <a:schemeClr val="tx1"/>
+                      </a:solidFill>
+                      <a:prstDash val="solid"/>
+                      <a:round/>
+                      <a:headEnd type="none" w="med" len="med"/>
+                      <a:tailEnd type="none" w="med" len="med"/>
+                    </a:lnR>
+                    <a:lnT w="12700" cmpd="sng">
+                      <a:noFill/>
+                    </a:lnT>
+                    <a:lnB w="12700" cmpd="sng">
+                      <a:noFill/>
+                    </a:lnB>
+                    <a:lnTlToBr w="12700" cmpd="sng">
+                      <a:noFill/>
+                      <a:prstDash val="solid"/>
+                    </a:lnTlToBr>
+                    <a:lnBlToTr w="12700" cmpd="sng">
+                      <a:noFill/>
+                      <a:prstDash val="solid"/>
+                    </a:lnBlToTr>
+                  </a:tcPr>
+                </a:tc>
+                <a:tc hMerge="1">
+                  <a:txBody>
+                    <a:bodyPr/>
+                    <a:lstStyle/>
+                    <a:p>
+                      <a:endParaRPr lang="en-US"/>
+                    </a:p>
+                  </a:txBody>
+                  <a:tcPr/>
+                </a:tc>
+              </a:tr>
+              <a:tr h="144405">
+                <a:tc>
+                  <a:txBody>
+                    <a:bodyPr/>
+                    <a:lstStyle/>
+                    <a:p>
+                      <a:r>
+                        <a:rPr lang="en-US" sz="1100" i="0" dirty="0" smtClean="0">
+                          <a:solidFill>
+                            <a:schemeClr val="tx1"/>
+                          </a:solidFill>
+                        </a:rPr>
+                        <a:t>    Identity</a:t>
+                      </a:r>
+                      <a:endParaRPr lang="en-US" sz="1100" b="0" i="0" dirty="0">
+                        <a:solidFill>
+                          <a:schemeClr val="tx1"/>
+                        </a:solidFill>
+                      </a:endParaRPr>
+                    </a:p>
+                  </a:txBody>
+                  <a:tcPr>
+                    <a:lnL w="12700" cap="flat" cmpd="sng" algn="ctr">
+                      <a:solidFill>
+                        <a:schemeClr val="tx1"/>
+                      </a:solidFill>
+                      <a:prstDash val="solid"/>
+                      <a:round/>
+                      <a:headEnd type="none" w="med" len="med"/>
+                      <a:tailEnd type="none" w="med" len="med"/>
+                    </a:lnL>
+                    <a:lnR w="12700" cap="flat" cmpd="sng" algn="ctr">
+                      <a:solidFill>
+                        <a:schemeClr val="tx1"/>
+                      </a:solidFill>
+                      <a:prstDash val="solid"/>
+                      <a:round/>
+                      <a:headEnd type="none" w="med" len="med"/>
+                      <a:tailEnd type="none" w="med" len="med"/>
+                    </a:lnR>
+                    <a:lnT w="12700" cmpd="sng">
+                      <a:noFill/>
+                    </a:lnT>
+                    <a:lnB w="12700" cmpd="sng">
+                      <a:noFill/>
                     </a:lnB>
                     <a:lnTlToBr w="12700" cmpd="sng">
                       <a:noFill/>
@@ -3296,7 +3536,120 @@
                     <a:bodyPr/>
                     <a:lstStyle/>
                     <a:p>
-                      <a:endParaRPr lang="en-US" sz="1200" dirty="0"/>
+                      <a:endParaRPr lang="en-US" sz="1100" b="0" dirty="0" smtClean="0">
+                        <a:solidFill>
+                          <a:schemeClr val="tx1"/>
+                        </a:solidFill>
+                      </a:endParaRPr>
+                    </a:p>
+                  </a:txBody>
+                  <a:tcPr>
+                    <a:lnL w="12700" cap="flat" cmpd="sng" algn="ctr">
+                      <a:solidFill>
+                        <a:schemeClr val="tx1"/>
+                      </a:solidFill>
+                      <a:prstDash val="solid"/>
+                      <a:round/>
+                      <a:headEnd type="none" w="med" len="med"/>
+                      <a:tailEnd type="none" w="med" len="med"/>
+                    </a:lnL>
+                    <a:lnR w="12700" cap="flat" cmpd="sng" algn="ctr">
+                      <a:noFill/>
+                      <a:prstDash val="solid"/>
+                      <a:round/>
+                      <a:headEnd type="none" w="med" len="med"/>
+                      <a:tailEnd type="none" w="med" len="med"/>
+                    </a:lnR>
+                    <a:lnT w="12700" cmpd="sng">
+                      <a:noFill/>
+                    </a:lnT>
+                    <a:lnB w="12700" cmpd="sng">
+                      <a:noFill/>
+                    </a:lnB>
+                    <a:lnTlToBr w="12700" cmpd="sng">
+                      <a:noFill/>
+                      <a:prstDash val="solid"/>
+                    </a:lnTlToBr>
+                    <a:lnBlToTr w="12700" cmpd="sng">
+                      <a:noFill/>
+                      <a:prstDash val="solid"/>
+                    </a:lnBlToTr>
+                  </a:tcPr>
+                </a:tc>
+                <a:tc>
+                  <a:txBody>
+                    <a:bodyPr/>
+                    <a:lstStyle/>
+                    <a:p>
+                      <a:pPr algn="r"/>
+                      <a:r>
+                        <a:rPr lang="en-US" sz="1100" b="0" dirty="0" smtClean="0">
+                          <a:solidFill>
+                            <a:schemeClr val="bg1">
+                              <a:lumMod val="50000"/>
+                            </a:schemeClr>
+                          </a:solidFill>
+                        </a:rPr>
+                        <a:t>CIQIdentity3.0InstanceType</a:t>
+                      </a:r>
+                      <a:endParaRPr lang="en-US" sz="1100" b="0" dirty="0" smtClean="0">
+                        <a:solidFill>
+                          <a:schemeClr val="bg1">
+                            <a:lumMod val="50000"/>
+                          </a:schemeClr>
+                        </a:solidFill>
+                      </a:endParaRPr>
+                    </a:p>
+                  </a:txBody>
+                  <a:tcPr>
+                    <a:lnL w="12700" cmpd="sng">
+                      <a:noFill/>
+                    </a:lnL>
+                    <a:lnR w="12700" cap="flat" cmpd="sng" algn="ctr">
+                      <a:solidFill>
+                        <a:schemeClr val="tx1"/>
+                      </a:solidFill>
+                      <a:prstDash val="solid"/>
+                      <a:round/>
+                      <a:headEnd type="none" w="med" len="med"/>
+                      <a:tailEnd type="none" w="med" len="med"/>
+                    </a:lnR>
+                    <a:lnT w="12700" cmpd="sng">
+                      <a:noFill/>
+                    </a:lnT>
+                    <a:lnB w="12700" cmpd="sng">
+                      <a:noFill/>
+                    </a:lnB>
+                    <a:lnTlToBr w="12700" cmpd="sng">
+                      <a:noFill/>
+                      <a:prstDash val="solid"/>
+                    </a:lnTlToBr>
+                    <a:lnBlToTr w="12700" cmpd="sng">
+                      <a:noFill/>
+                      <a:prstDash val="solid"/>
+                    </a:lnBlToTr>
+                  </a:tcPr>
+                </a:tc>
+              </a:tr>
+              <a:tr h="144405">
+                <a:tc>
+                  <a:txBody>
+                    <a:bodyPr/>
+                    <a:lstStyle/>
+                    <a:p>
+                      <a:r>
+                        <a:rPr lang="en-US" sz="1100" i="0" dirty="0" smtClean="0">
+                          <a:solidFill>
+                            <a:schemeClr val="tx1"/>
+                          </a:solidFill>
+                        </a:rPr>
+                        <a:t>        Specification</a:t>
+                      </a:r>
+                      <a:endParaRPr lang="en-US" sz="1100" b="0" i="0" dirty="0">
+                        <a:solidFill>
+                          <a:schemeClr val="tx1"/>
+                        </a:solidFill>
+                      </a:endParaRPr>
                     </a:p>
                   </a:txBody>
                   <a:tcPr>
@@ -3318,19 +3671,11 @@
                       <a:headEnd type="none" w="med" len="med"/>
                       <a:tailEnd type="none" w="med" len="med"/>
                     </a:lnR>
-                    <a:lnT w="12700" cap="flat" cmpd="sng" algn="ctr">
-                      <a:noFill/>
-                      <a:prstDash val="solid"/>
-                      <a:round/>
-                      <a:headEnd type="none" w="med" len="med"/>
-                      <a:tailEnd type="none" w="med" len="med"/>
+                    <a:lnT w="12700" cmpd="sng">
+                      <a:noFill/>
                     </a:lnT>
-                    <a:lnB w="12700" cap="flat" cmpd="sng" algn="ctr">
-                      <a:noFill/>
-                      <a:prstDash val="solid"/>
-                      <a:round/>
-                      <a:headEnd type="none" w="med" len="med"/>
-                      <a:tailEnd type="none" w="med" len="med"/>
+                    <a:lnB w="12700" cmpd="sng">
+                      <a:noFill/>
                     </a:lnB>
                     <a:lnTlToBr w="12700" cmpd="sng">
                       <a:noFill/>
@@ -3342,18 +3687,35 @@
                     </a:lnBlToTr>
                   </a:tcPr>
                 </a:tc>
-              </a:tr>
-              <a:tr h="276599">
-                <a:tc>
+                <a:tc gridSpan="2">
                   <a:txBody>
                     <a:bodyPr/>
                     <a:lstStyle/>
                     <a:p>
-                      <a:r>
-                        <a:rPr lang="en-US" sz="1200" b="0" baseline="0" dirty="0" err="1" smtClean="0"/>
-                        <a:t>Victim_Targeting</a:t>
-                      </a:r>
-                      <a:endParaRPr lang="en-US" sz="1200" b="0" dirty="0"/>
+                      <a:pPr marL="0" marR="0" indent="0" algn="l" defTabSz="914400" rtl="0" eaLnBrk="1" fontAlgn="auto" latinLnBrk="0" hangingPunct="1">
+                        <a:lnSpc>
+                          <a:spcPct val="100000"/>
+                        </a:lnSpc>
+                        <a:spcBef>
+                          <a:spcPts val="0"/>
+                        </a:spcBef>
+                        <a:spcAft>
+                          <a:spcPts val="0"/>
+                        </a:spcAft>
+                        <a:buClrTx/>
+                        <a:buSzTx/>
+                        <a:buFontTx/>
+                        <a:buNone/>
+                        <a:tabLst/>
+                        <a:defRPr/>
+                      </a:pPr>
+                      <a:endParaRPr lang="en-US" sz="1100" dirty="0" smtClean="0">
+                        <a:solidFill>
+                          <a:schemeClr val="bg1">
+                            <a:lumMod val="50000"/>
+                          </a:schemeClr>
+                        </a:solidFill>
+                      </a:endParaRPr>
                     </a:p>
                   </a:txBody>
                   <a:tcPr>
@@ -3375,19 +3737,11 @@
                       <a:headEnd type="none" w="med" len="med"/>
                       <a:tailEnd type="none" w="med" len="med"/>
                     </a:lnR>
-                    <a:lnT w="12700" cap="flat" cmpd="sng" algn="ctr">
-                      <a:noFill/>
-                      <a:prstDash val="solid"/>
-                      <a:round/>
-                      <a:headEnd type="none" w="med" len="med"/>
-                      <a:tailEnd type="none" w="med" len="med"/>
+                    <a:lnT w="12700" cmpd="sng">
+                      <a:noFill/>
                     </a:lnT>
-                    <a:lnB w="12700" cap="flat" cmpd="sng" algn="ctr">
-                      <a:noFill/>
-                      <a:prstDash val="solid"/>
-                      <a:round/>
-                      <a:headEnd type="none" w="med" len="med"/>
-                      <a:tailEnd type="none" w="med" len="med"/>
+                    <a:lnB w="12700" cmpd="sng">
+                      <a:noFill/>
                     </a:lnB>
                     <a:lnTlToBr w="12700" cmpd="sng">
                       <a:noFill/>
@@ -3399,12 +3753,52 @@
                     </a:lnBlToTr>
                   </a:tcPr>
                 </a:tc>
+                <a:tc hMerge="1">
+                  <a:txBody>
+                    <a:bodyPr/>
+                    <a:lstStyle/>
+                    <a:p>
+                      <a:endParaRPr lang="en-US"/>
+                    </a:p>
+                  </a:txBody>
+                  <a:tcPr/>
+                </a:tc>
+              </a:tr>
+              <a:tr h="144405">
                 <a:tc>
                   <a:txBody>
                     <a:bodyPr/>
                     <a:lstStyle/>
                     <a:p>
-                      <a:endParaRPr lang="en-US" sz="1200" b="0" dirty="0" smtClean="0"/>
+                      <a:r>
+                        <a:rPr lang="en-US" sz="1100" b="0" i="0" dirty="0" smtClean="0">
+                          <a:solidFill>
+                            <a:schemeClr val="tx1"/>
+                          </a:solidFill>
+                        </a:rPr>
+                        <a:t>            </a:t>
+                      </a:r>
+                      <a:r>
+                        <a:rPr lang="en-US" sz="1100" b="0" i="0" dirty="0" err="1" smtClean="0">
+                          <a:solidFill>
+                            <a:schemeClr val="tx1"/>
+                          </a:solidFill>
+                        </a:rPr>
+                        <a:t>Organisation</a:t>
+                      </a:r>
+                      <a:r>
+                        <a:rPr lang="en-US" sz="1100" b="0" i="0" dirty="0" smtClean="0">
+                          <a:solidFill>
+                            <a:schemeClr val="tx1"/>
+                          </a:solidFill>
+                        </a:rPr>
+                        <a:t> Info</a:t>
+                      </a:r>
+                      <a:endParaRPr lang="en-US" sz="1100" b="0" i="0" dirty="0">
+                        <a:solidFill>
+                          <a:schemeClr val="tx1"/>
+                        </a:solidFill>
+                      </a:endParaRPr>
                     </a:p>
                   </a:txBody>
                   <a:tcPr>
@@ -3426,19 +3820,11 @@
                       <a:headEnd type="none" w="med" len="med"/>
                       <a:tailEnd type="none" w="med" len="med"/>
                     </a:lnR>
-                    <a:lnT w="12700" cap="flat" cmpd="sng" algn="ctr">
-                      <a:noFill/>
-                      <a:prstDash val="solid"/>
-                      <a:round/>
-                      <a:headEnd type="none" w="med" len="med"/>
-                      <a:tailEnd type="none" w="med" len="med"/>
+                    <a:lnT w="12700" cmpd="sng">
+                      <a:noFill/>
                     </a:lnT>
-                    <a:lnB w="12700" cap="flat" cmpd="sng" algn="ctr">
-                      <a:noFill/>
-                      <a:prstDash val="solid"/>
-                      <a:round/>
-                      <a:headEnd type="none" w="med" len="med"/>
-                      <a:tailEnd type="none" w="med" len="med"/>
+                    <a:lnB w="12700" cmpd="sng">
+                      <a:noFill/>
                     </a:lnB>
                     <a:lnTlToBr w="12700" cmpd="sng">
                       <a:noFill/>
@@ -3450,22 +3836,19 @@
                     </a:lnBlToTr>
                   </a:tcPr>
                 </a:tc>
-              </a:tr>
-              <a:tr h="276599">
-                <a:tc>
+                <a:tc gridSpan="2">
                   <a:txBody>
                     <a:bodyPr/>
                     <a:lstStyle/>
                     <a:p>
-                      <a:r>
-                        <a:rPr lang="en-US" sz="1200" b="0" baseline="0" dirty="0" smtClean="0"/>
-                        <a:t>    </a:t>
-                      </a:r>
-                      <a:r>
-                        <a:rPr lang="en-US" sz="1200" b="0" baseline="0" dirty="0" smtClean="0"/>
-                        <a:t>Identity</a:t>
-                      </a:r>
-                      <a:endParaRPr lang="en-US" sz="1200" b="0" dirty="0" smtClean="0"/>
+                      <a:pPr algn="r"/>
+                      <a:endParaRPr lang="en-US" sz="1100" b="0" dirty="0" smtClean="0">
+                        <a:solidFill>
+                          <a:schemeClr val="bg1">
+                            <a:lumMod val="50000"/>
+                          </a:schemeClr>
+                        </a:solidFill>
+                      </a:endParaRPr>
                     </a:p>
                   </a:txBody>
                   <a:tcPr>
@@ -3487,19 +3870,11 @@
                       <a:headEnd type="none" w="med" len="med"/>
                       <a:tailEnd type="none" w="med" len="med"/>
                     </a:lnR>
-                    <a:lnT w="12700" cap="flat" cmpd="sng" algn="ctr">
-                      <a:noFill/>
-                      <a:prstDash val="solid"/>
-                      <a:round/>
-                      <a:headEnd type="none" w="med" len="med"/>
-                      <a:tailEnd type="none" w="med" len="med"/>
+                    <a:lnT w="12700" cmpd="sng">
+                      <a:noFill/>
                     </a:lnT>
-                    <a:lnB w="12700" cap="flat" cmpd="sng" algn="ctr">
-                      <a:noFill/>
-                      <a:prstDash val="solid"/>
-                      <a:round/>
-                      <a:headEnd type="none" w="med" len="med"/>
-                      <a:tailEnd type="none" w="med" len="med"/>
+                    <a:lnB w="12700" cmpd="sng">
+                      <a:noFill/>
                     </a:lnB>
                     <a:lnTlToBr w="12700" cmpd="sng">
                       <a:noFill/>
@@ -3511,24 +3886,44 @@
                     </a:lnBlToTr>
                   </a:tcPr>
                 </a:tc>
+                <a:tc hMerge="1">
+                  <a:txBody>
+                    <a:bodyPr/>
+                    <a:lstStyle/>
+                    <a:p>
+                      <a:endParaRPr lang="en-US"/>
+                    </a:p>
+                  </a:txBody>
+                  <a:tcPr/>
+                </a:tc>
+              </a:tr>
+              <a:tr h="144405">
                 <a:tc>
                   <a:txBody>
                     <a:bodyPr/>
                     <a:lstStyle/>
                     <a:p>
                       <a:r>
-                        <a:rPr lang="en-US" sz="1200" b="1" dirty="0" err="1" smtClean="0"/>
-                        <a:t>xsi</a:t>
+                        <a:rPr lang="en-US" sz="1100" b="0" i="0" dirty="0" smtClean="0">
+                          <a:solidFill>
+                            <a:schemeClr val="tx1"/>
+                          </a:solidFill>
+                        </a:rPr>
+                        <a:t>            </a:t>
                       </a:r>
                       <a:r>
-                        <a:rPr lang="en-US" sz="1200" b="1" dirty="0" smtClean="0"/>
-                        <a:t>: </a:t>
+                        <a:rPr lang="en-US" sz="1100" b="0" i="0" dirty="0" smtClean="0">
+                          <a:solidFill>
+                            <a:schemeClr val="tx1"/>
+                          </a:solidFill>
+                        </a:rPr>
+                        <a:t>    Industry Type</a:t>
                       </a:r>
-                      <a:r>
-                        <a:rPr lang="en-US" sz="1200" b="0" dirty="0" smtClean="0"/>
-                        <a:t>CIQIdentity3.0InstanceType</a:t>
-                      </a:r>
-                      <a:endParaRPr lang="en-US" sz="1200" b="1" dirty="0"/>
+                      <a:endParaRPr lang="en-US" sz="1100" b="0" i="0" dirty="0">
+                        <a:solidFill>
+                          <a:schemeClr val="tx1"/>
+                        </a:solidFill>
+                      </a:endParaRPr>
                     </a:p>
                   </a:txBody>
                   <a:tcPr>
@@ -3550,15 +3945,13 @@
                       <a:headEnd type="none" w="med" len="med"/>
                       <a:tailEnd type="none" w="med" len="med"/>
                     </a:lnR>
-                    <a:lnT w="12700" cap="flat" cmpd="sng" algn="ctr">
-                      <a:noFill/>
-                      <a:prstDash val="solid"/>
-                      <a:round/>
-                      <a:headEnd type="none" w="med" len="med"/>
-                      <a:tailEnd type="none" w="med" len="med"/>
+                    <a:lnT w="12700" cmpd="sng">
+                      <a:noFill/>
                     </a:lnT>
                     <a:lnB w="12700" cap="flat" cmpd="sng" algn="ctr">
-                      <a:noFill/>
+                      <a:solidFill>
+                        <a:schemeClr val="tx1"/>
+                      </a:solidFill>
                       <a:prstDash val="solid"/>
                       <a:round/>
                       <a:headEnd type="none" w="med" len="med"/>
@@ -3574,22 +3967,20 @@
                     </a:lnBlToTr>
                   </a:tcPr>
                 </a:tc>
-              </a:tr>
-              <a:tr h="276599">
-                <a:tc>
+                <a:tc gridSpan="2">
                   <a:txBody>
                     <a:bodyPr/>
                     <a:lstStyle/>
                     <a:p>
                       <a:r>
-                        <a:rPr lang="en-US" sz="1200" b="0" dirty="0" smtClean="0"/>
-                        <a:t>        </a:t>
+                        <a:rPr lang="en-US" sz="1100" b="0" dirty="0" smtClean="0"/>
+                        <a:t>Electricity, Industrial</a:t>
                       </a:r>
                       <a:r>
-                        <a:rPr lang="en-US" sz="1200" b="0" dirty="0" smtClean="0"/>
-                        <a:t>Specification</a:t>
+                        <a:rPr lang="en-US" sz="1100" b="0" baseline="0" dirty="0" smtClean="0"/>
+                        <a:t> Control Systems</a:t>
                       </a:r>
-                      <a:endParaRPr lang="en-US" sz="1200" b="0" dirty="0"/>
+                      <a:endParaRPr lang="en-US" sz="1100" b="1" dirty="0"/>
                     </a:p>
                   </a:txBody>
                   <a:tcPr>
@@ -3611,15 +4002,13 @@
                       <a:headEnd type="none" w="med" len="med"/>
                       <a:tailEnd type="none" w="med" len="med"/>
                     </a:lnR>
-                    <a:lnT w="12700" cap="flat" cmpd="sng" algn="ctr">
-                      <a:noFill/>
-                      <a:prstDash val="solid"/>
-                      <a:round/>
-                      <a:headEnd type="none" w="med" len="med"/>
-                      <a:tailEnd type="none" w="med" len="med"/>
+                    <a:lnT w="12700" cmpd="sng">
+                      <a:noFill/>
                     </a:lnT>
                     <a:lnB w="12700" cap="flat" cmpd="sng" algn="ctr">
-                      <a:noFill/>
+                      <a:solidFill>
+                        <a:schemeClr val="tx1"/>
+                      </a:solidFill>
                       <a:prstDash val="solid"/>
                       <a:round/>
                       <a:headEnd type="none" w="med" len="med"/>
@@ -3635,188 +4024,15 @@
                     </a:lnBlToTr>
                   </a:tcPr>
                 </a:tc>
-                <a:tc>
+                <a:tc hMerge="1">
                   <a:txBody>
                     <a:bodyPr/>
                     <a:lstStyle/>
                     <a:p>
-                      <a:endParaRPr lang="en-US" sz="1200" dirty="0"/>
+                      <a:endParaRPr lang="en-US"/>
                     </a:p>
                   </a:txBody>
-                  <a:tcPr>
-                    <a:lnL w="12700" cap="flat" cmpd="sng" algn="ctr">
-                      <a:solidFill>
-                        <a:schemeClr val="tx1"/>
-                      </a:solidFill>
-                      <a:prstDash val="solid"/>
-                      <a:round/>
-                      <a:headEnd type="none" w="med" len="med"/>
-                      <a:tailEnd type="none" w="med" len="med"/>
-                    </a:lnL>
-                    <a:lnR w="12700" cap="flat" cmpd="sng" algn="ctr">
-                      <a:solidFill>
-                        <a:schemeClr val="tx1"/>
-                      </a:solidFill>
-                      <a:prstDash val="solid"/>
-                      <a:round/>
-                      <a:headEnd type="none" w="med" len="med"/>
-                      <a:tailEnd type="none" w="med" len="med"/>
-                    </a:lnR>
-                    <a:lnT w="12700" cap="flat" cmpd="sng" algn="ctr">
-                      <a:noFill/>
-                      <a:prstDash val="solid"/>
-                      <a:round/>
-                      <a:headEnd type="none" w="med" len="med"/>
-                      <a:tailEnd type="none" w="med" len="med"/>
-                    </a:lnT>
-                    <a:lnB w="12700" cap="flat" cmpd="sng" algn="ctr">
-                      <a:noFill/>
-                      <a:prstDash val="solid"/>
-                      <a:round/>
-                      <a:headEnd type="none" w="med" len="med"/>
-                      <a:tailEnd type="none" w="med" len="med"/>
-                    </a:lnB>
-                    <a:lnTlToBr w="12700" cmpd="sng">
-                      <a:noFill/>
-                      <a:prstDash val="solid"/>
-                    </a:lnTlToBr>
-                    <a:lnBlToTr w="12700" cmpd="sng">
-                      <a:noFill/>
-                      <a:prstDash val="solid"/>
-                    </a:lnBlToTr>
-                  </a:tcPr>
-                </a:tc>
-              </a:tr>
-              <a:tr h="276599">
-                <a:tc>
-                  <a:txBody>
-                    <a:bodyPr/>
-                    <a:lstStyle/>
-                    <a:p>
-                      <a:r>
-                        <a:rPr lang="en-US" sz="1200" b="0" dirty="0" smtClean="0"/>
-                        <a:t>            </a:t>
-                      </a:r>
-                      <a:r>
-                        <a:rPr lang="en-US" sz="1200" b="0" dirty="0" err="1" smtClean="0"/>
-                        <a:t>OrganisationInfo</a:t>
-                      </a:r>
-                      <a:endParaRPr lang="en-US" sz="1200" b="0" dirty="0"/>
-                    </a:p>
-                  </a:txBody>
-                  <a:tcPr>
-                    <a:lnL w="12700" cap="flat" cmpd="sng" algn="ctr">
-                      <a:solidFill>
-                        <a:schemeClr val="tx1"/>
-                      </a:solidFill>
-                      <a:prstDash val="solid"/>
-                      <a:round/>
-                      <a:headEnd type="none" w="med" len="med"/>
-                      <a:tailEnd type="none" w="med" len="med"/>
-                    </a:lnL>
-                    <a:lnR w="12700" cap="flat" cmpd="sng" algn="ctr">
-                      <a:solidFill>
-                        <a:schemeClr val="tx1"/>
-                      </a:solidFill>
-                      <a:prstDash val="solid"/>
-                      <a:round/>
-                      <a:headEnd type="none" w="med" len="med"/>
-                      <a:tailEnd type="none" w="med" len="med"/>
-                    </a:lnR>
-                    <a:lnT w="12700" cap="flat" cmpd="sng" algn="ctr">
-                      <a:noFill/>
-                      <a:prstDash val="solid"/>
-                      <a:round/>
-                      <a:headEnd type="none" w="med" len="med"/>
-                      <a:tailEnd type="none" w="med" len="med"/>
-                    </a:lnT>
-                    <a:lnB w="12700" cap="flat" cmpd="sng" algn="ctr">
-                      <a:solidFill>
-                        <a:schemeClr val="tx1"/>
-                      </a:solidFill>
-                      <a:prstDash val="solid"/>
-                      <a:round/>
-                      <a:headEnd type="none" w="med" len="med"/>
-                      <a:tailEnd type="none" w="med" len="med"/>
-                    </a:lnB>
-                    <a:lnTlToBr w="12700" cmpd="sng">
-                      <a:noFill/>
-                      <a:prstDash val="solid"/>
-                    </a:lnTlToBr>
-                    <a:lnBlToTr w="12700" cmpd="sng">
-                      <a:noFill/>
-                      <a:prstDash val="solid"/>
-                    </a:lnBlToTr>
-                  </a:tcPr>
-                </a:tc>
-                <a:tc>
-                  <a:txBody>
-                    <a:bodyPr/>
-                    <a:lstStyle/>
-                    <a:p>
-                      <a:r>
-                        <a:rPr lang="en-US" sz="1200" b="1" dirty="0" err="1" smtClean="0"/>
-                        <a:t>IndustryType</a:t>
-                      </a:r>
-                      <a:r>
-                        <a:rPr lang="en-US" sz="1200" b="1" dirty="0" smtClean="0"/>
-                        <a:t>: </a:t>
-                      </a:r>
-                      <a:r>
-                        <a:rPr lang="en-US" sz="1200" b="0" dirty="0" smtClean="0"/>
-                        <a:t>Electricity, Industrial</a:t>
-                      </a:r>
-                      <a:r>
-                        <a:rPr lang="en-US" sz="1200" b="0" baseline="0" dirty="0" smtClean="0"/>
-                        <a:t> Control Systems</a:t>
-                      </a:r>
-                      <a:endParaRPr lang="en-US" sz="1200" b="1" dirty="0"/>
-                    </a:p>
-                  </a:txBody>
-                  <a:tcPr>
-                    <a:lnL w="12700" cap="flat" cmpd="sng" algn="ctr">
-                      <a:solidFill>
-                        <a:schemeClr val="tx1"/>
-                      </a:solidFill>
-                      <a:prstDash val="solid"/>
-                      <a:round/>
-                      <a:headEnd type="none" w="med" len="med"/>
-                      <a:tailEnd type="none" w="med" len="med"/>
-                    </a:lnL>
-                    <a:lnR w="12700" cap="flat" cmpd="sng" algn="ctr">
-                      <a:solidFill>
-                        <a:schemeClr val="tx1"/>
-                      </a:solidFill>
-                      <a:prstDash val="solid"/>
-                      <a:round/>
-                      <a:headEnd type="none" w="med" len="med"/>
-                      <a:tailEnd type="none" w="med" len="med"/>
-                    </a:lnR>
-                    <a:lnT w="12700" cap="flat" cmpd="sng" algn="ctr">
-                      <a:noFill/>
-                      <a:prstDash val="solid"/>
-                      <a:round/>
-                      <a:headEnd type="none" w="med" len="med"/>
-                      <a:tailEnd type="none" w="med" len="med"/>
-                    </a:lnT>
-                    <a:lnB w="12700" cap="flat" cmpd="sng" algn="ctr">
-                      <a:solidFill>
-                        <a:schemeClr val="tx1"/>
-                      </a:solidFill>
-                      <a:prstDash val="solid"/>
-                      <a:round/>
-                      <a:headEnd type="none" w="med" len="med"/>
-                      <a:tailEnd type="none" w="med" len="med"/>
-                    </a:lnB>
-                    <a:lnTlToBr w="12700" cmpd="sng">
-                      <a:noFill/>
-                      <a:prstDash val="solid"/>
-                    </a:lnTlToBr>
-                    <a:lnBlToTr w="12700" cmpd="sng">
-                      <a:noFill/>
-                      <a:prstDash val="solid"/>
-                    </a:lnBlToTr>
-                  </a:tcPr>
+                  <a:tcPr/>
                 </a:tc>
               </a:tr>
             </a:tbl>

</xml_diff>

<commit_message>
Added Title to the block diagram and python code to match the Title in the XML.
Made a few other important tweaks to language.
</commit_message>
<xml_diff>
--- a/idioms/ttp/industry-sector/diagram.pptx
+++ b/idioms/ttp/industry-sector/diagram.pptx
@@ -288,7 +288,7 @@
           <a:p>
             <a:fld id="{13F24B86-36D2-4655-BE2F-98B661AC85E1}" type="datetimeFigureOut">
               <a:rPr lang="en-US" smtClean="0"/>
-              <a:t>3/28/2014</a:t>
+              <a:t>3/30/14</a:t>
             </a:fld>
             <a:endParaRPr lang="en-US"/>
           </a:p>
@@ -458,7 +458,7 @@
           <a:p>
             <a:fld id="{13F24B86-36D2-4655-BE2F-98B661AC85E1}" type="datetimeFigureOut">
               <a:rPr lang="en-US" smtClean="0"/>
-              <a:t>3/28/2014</a:t>
+              <a:t>3/30/14</a:t>
             </a:fld>
             <a:endParaRPr lang="en-US"/>
           </a:p>
@@ -638,7 +638,7 @@
           <a:p>
             <a:fld id="{13F24B86-36D2-4655-BE2F-98B661AC85E1}" type="datetimeFigureOut">
               <a:rPr lang="en-US" smtClean="0"/>
-              <a:t>3/28/2014</a:t>
+              <a:t>3/30/14</a:t>
             </a:fld>
             <a:endParaRPr lang="en-US"/>
           </a:p>
@@ -808,7 +808,7 @@
           <a:p>
             <a:fld id="{13F24B86-36D2-4655-BE2F-98B661AC85E1}" type="datetimeFigureOut">
               <a:rPr lang="en-US" smtClean="0"/>
-              <a:t>3/28/2014</a:t>
+              <a:t>3/30/14</a:t>
             </a:fld>
             <a:endParaRPr lang="en-US"/>
           </a:p>
@@ -1054,7 +1054,7 @@
           <a:p>
             <a:fld id="{13F24B86-36D2-4655-BE2F-98B661AC85E1}" type="datetimeFigureOut">
               <a:rPr lang="en-US" smtClean="0"/>
-              <a:t>3/28/2014</a:t>
+              <a:t>3/30/14</a:t>
             </a:fld>
             <a:endParaRPr lang="en-US"/>
           </a:p>
@@ -1342,7 +1342,7 @@
           <a:p>
             <a:fld id="{13F24B86-36D2-4655-BE2F-98B661AC85E1}" type="datetimeFigureOut">
               <a:rPr lang="en-US" smtClean="0"/>
-              <a:t>3/28/2014</a:t>
+              <a:t>3/30/14</a:t>
             </a:fld>
             <a:endParaRPr lang="en-US"/>
           </a:p>
@@ -1764,7 +1764,7 @@
           <a:p>
             <a:fld id="{13F24B86-36D2-4655-BE2F-98B661AC85E1}" type="datetimeFigureOut">
               <a:rPr lang="en-US" smtClean="0"/>
-              <a:t>3/28/2014</a:t>
+              <a:t>3/30/14</a:t>
             </a:fld>
             <a:endParaRPr lang="en-US"/>
           </a:p>
@@ -1882,7 +1882,7 @@
           <a:p>
             <a:fld id="{13F24B86-36D2-4655-BE2F-98B661AC85E1}" type="datetimeFigureOut">
               <a:rPr lang="en-US" smtClean="0"/>
-              <a:t>3/28/2014</a:t>
+              <a:t>3/30/14</a:t>
             </a:fld>
             <a:endParaRPr lang="en-US"/>
           </a:p>
@@ -1977,7 +1977,7 @@
           <a:p>
             <a:fld id="{13F24B86-36D2-4655-BE2F-98B661AC85E1}" type="datetimeFigureOut">
               <a:rPr lang="en-US" smtClean="0"/>
-              <a:t>3/28/2014</a:t>
+              <a:t>3/30/14</a:t>
             </a:fld>
             <a:endParaRPr lang="en-US"/>
           </a:p>
@@ -2254,7 +2254,7 @@
           <a:p>
             <a:fld id="{13F24B86-36D2-4655-BE2F-98B661AC85E1}" type="datetimeFigureOut">
               <a:rPr lang="en-US" smtClean="0"/>
-              <a:t>3/28/2014</a:t>
+              <a:t>3/30/14</a:t>
             </a:fld>
             <a:endParaRPr lang="en-US"/>
           </a:p>
@@ -2507,7 +2507,7 @@
           <a:p>
             <a:fld id="{13F24B86-36D2-4655-BE2F-98B661AC85E1}" type="datetimeFigureOut">
               <a:rPr lang="en-US" smtClean="0"/>
-              <a:t>3/28/2014</a:t>
+              <a:t>3/30/14</a:t>
             </a:fld>
             <a:endParaRPr lang="en-US"/>
           </a:p>
@@ -2720,7 +2720,7 @@
           <a:p>
             <a:fld id="{13F24B86-36D2-4655-BE2F-98B661AC85E1}" type="datetimeFigureOut">
               <a:rPr lang="en-US" smtClean="0"/>
-              <a:t>3/28/2014</a:t>
+              <a:t>3/30/14</a:t>
             </a:fld>
             <a:endParaRPr lang="en-US"/>
           </a:p>
@@ -3104,14 +3104,14 @@
           <p:nvPr>
             <p:extLst>
               <p:ext uri="{D42A27DB-BD31-4B8C-83A1-F6EECF244321}">
-                <p14:modId xmlns:p14="http://schemas.microsoft.com/office/powerpoint/2010/main" val="2899987242"/>
+                <p14:modId xmlns:p14="http://schemas.microsoft.com/office/powerpoint/2010/main" val="398851062"/>
               </p:ext>
             </p:extLst>
           </p:nvPr>
         </p:nvGraphicFramePr>
         <p:xfrm>
           <a:off x="2733675" y="2564130"/>
-          <a:ext cx="5056497" cy="1889760"/>
+          <a:ext cx="5056497" cy="2316480"/>
         </p:xfrm>
         <a:graphic>
           <a:graphicData uri="http://schemas.openxmlformats.org/drawingml/2006/table">
@@ -3368,6 +3368,124 @@
                     <a:lstStyle/>
                     <a:p>
                       <a:r>
+                        <a:rPr lang="en-US" sz="1100" b="0" i="0" dirty="0" smtClean="0">
+                          <a:solidFill>
+                            <a:schemeClr val="tx1"/>
+                          </a:solidFill>
+                        </a:rPr>
+                        <a:t>Title</a:t>
+                      </a:r>
+                      <a:endParaRPr lang="en-US" sz="1100" b="0" i="0" dirty="0">
+                        <a:solidFill>
+                          <a:schemeClr val="tx1"/>
+                        </a:solidFill>
+                      </a:endParaRPr>
+                    </a:p>
+                  </a:txBody>
+                  <a:tcPr>
+                    <a:lnL w="12700" cap="flat" cmpd="sng" algn="ctr">
+                      <a:solidFill>
+                        <a:schemeClr val="tx1"/>
+                      </a:solidFill>
+                      <a:prstDash val="solid"/>
+                      <a:round/>
+                      <a:headEnd type="none" w="med" len="med"/>
+                      <a:tailEnd type="none" w="med" len="med"/>
+                    </a:lnL>
+                    <a:lnR w="12700" cap="flat" cmpd="sng" algn="ctr">
+                      <a:solidFill>
+                        <a:schemeClr val="tx1"/>
+                      </a:solidFill>
+                      <a:prstDash val="solid"/>
+                      <a:round/>
+                      <a:headEnd type="none" w="med" len="med"/>
+                      <a:tailEnd type="none" w="med" len="med"/>
+                    </a:lnR>
+                    <a:lnT w="12700" cmpd="sng">
+                      <a:noFill/>
+                    </a:lnT>
+                    <a:lnB w="12700" cmpd="sng">
+                      <a:noFill/>
+                    </a:lnB>
+                    <a:lnTlToBr w="12700" cmpd="sng">
+                      <a:noFill/>
+                      <a:prstDash val="solid"/>
+                    </a:lnTlToBr>
+                    <a:lnBlToTr w="12700" cmpd="sng">
+                      <a:noFill/>
+                      <a:prstDash val="solid"/>
+                    </a:lnBlToTr>
+                  </a:tcPr>
+                </a:tc>
+                <a:tc gridSpan="2">
+                  <a:txBody>
+                    <a:bodyPr/>
+                    <a:lstStyle/>
+                    <a:p>
+                      <a:r>
+                        <a:rPr lang="en-US" sz="1100" dirty="0" smtClean="0"/>
+                        <a:t>Victim Targeting: Electricity Sector and Industrial Control System Sector</a:t>
+                      </a:r>
+                      <a:endParaRPr lang="en-US" sz="1100" b="0" dirty="0" smtClean="0">
+                        <a:solidFill>
+                          <a:schemeClr val="tx1"/>
+                        </a:solidFill>
+                      </a:endParaRPr>
+                    </a:p>
+                  </a:txBody>
+                  <a:tcPr>
+                    <a:lnL w="12700" cap="flat" cmpd="sng" algn="ctr">
+                      <a:solidFill>
+                        <a:schemeClr val="tx1"/>
+                      </a:solidFill>
+                      <a:prstDash val="solid"/>
+                      <a:round/>
+                      <a:headEnd type="none" w="med" len="med"/>
+                      <a:tailEnd type="none" w="med" len="med"/>
+                    </a:lnL>
+                    <a:lnR w="12700" cap="flat" cmpd="sng" algn="ctr">
+                      <a:solidFill>
+                        <a:schemeClr val="tx1"/>
+                      </a:solidFill>
+                      <a:prstDash val="solid"/>
+                      <a:round/>
+                      <a:headEnd type="none" w="med" len="med"/>
+                      <a:tailEnd type="none" w="med" len="med"/>
+                    </a:lnR>
+                    <a:lnT w="12700" cmpd="sng">
+                      <a:noFill/>
+                    </a:lnT>
+                    <a:lnB w="12700" cmpd="sng">
+                      <a:noFill/>
+                    </a:lnB>
+                    <a:lnTlToBr w="12700" cmpd="sng">
+                      <a:noFill/>
+                      <a:prstDash val="solid"/>
+                    </a:lnTlToBr>
+                    <a:lnBlToTr w="12700" cmpd="sng">
+                      <a:noFill/>
+                      <a:prstDash val="solid"/>
+                    </a:lnBlToTr>
+                  </a:tcPr>
+                </a:tc>
+                <a:tc hMerge="1">
+                  <a:txBody>
+                    <a:bodyPr/>
+                    <a:lstStyle/>
+                    <a:p>
+                      <a:endParaRPr lang="en-US"/>
+                    </a:p>
+                  </a:txBody>
+                  <a:tcPr/>
+                </a:tc>
+              </a:tr>
+              <a:tr h="144405">
+                <a:tc>
+                  <a:txBody>
+                    <a:bodyPr/>
+                    <a:lstStyle/>
+                    <a:p>
+                      <a:r>
                         <a:rPr lang="en-US" sz="1100" i="0" dirty="0" smtClean="0">
                           <a:solidFill>
                             <a:schemeClr val="tx1"/>
@@ -3592,13 +3710,6 @@
                         </a:rPr>
                         <a:t>CIQIdentity3.0InstanceType</a:t>
                       </a:r>
-                      <a:endParaRPr lang="en-US" sz="1100" b="0" dirty="0" smtClean="0">
-                        <a:solidFill>
-                          <a:schemeClr val="bg1">
-                            <a:lumMod val="50000"/>
-                          </a:schemeClr>
-                        </a:solidFill>
-                      </a:endParaRPr>
                     </a:p>
                   </a:txBody>
                   <a:tcPr>
@@ -3909,15 +4020,7 @@
                             <a:schemeClr val="tx1"/>
                           </a:solidFill>
                         </a:rPr>
-                        <a:t>            </a:t>
-                      </a:r>
-                      <a:r>
-                        <a:rPr lang="en-US" sz="1100" b="0" i="0" dirty="0" smtClean="0">
-                          <a:solidFill>
-                            <a:schemeClr val="tx1"/>
-                          </a:solidFill>
-                        </a:rPr>
-                        <a:t>    Industry Type</a:t>
+                        <a:t>                Industry Type</a:t>
                       </a:r>
                       <a:endParaRPr lang="en-US" sz="1100" b="0" i="0" dirty="0">
                         <a:solidFill>

</xml_diff>